<commit_message>
Describe Observer and Proxy usage
</commit_message>
<xml_diff>
--- a/docs/brief.pptx
+++ b/docs/brief.pptx
@@ -109,6 +109,11 @@
       </a:defRPr>
     </a:lvl9pPr>
   </p:defaultTextStyle>
+  <p:extLst>
+    <p:ext uri="{EFAFB233-063F-42B5-8137-9DF3F51BA10A}">
+      <p15:sldGuideLst xmlns:p15="http://schemas.microsoft.com/office/powerpoint/2012/main"/>
+    </p:ext>
+  </p:extLst>
 </p:presentation>
 </file>
 
@@ -207,7 +212,7 @@
           <a:effectLst/>
           <a:extLst>
             <a:ext uri="{91240B29-F687-4f45-9708-019B960494DF}">
-              <a14:hiddenLine xmlns:a14="http://schemas.microsoft.com/office/drawing/2010/main" xmlns="" w="9525">
+              <a14:hiddenLine xmlns="" xmlns:a14="http://schemas.microsoft.com/office/drawing/2010/main" w="9525">
                 <a:solidFill>
                   <a:srgbClr val="000000"/>
                 </a:solidFill>
@@ -1717,7 +1722,7 @@
           <a:ln/>
           <a:extLst>
             <a:ext uri="{91240B29-F687-4f45-9708-019B960494DF}">
-              <a14:hiddenLine xmlns:a14="http://schemas.microsoft.com/office/drawing/2010/main" xmlns="" w="9525">
+              <a14:hiddenLine xmlns="" xmlns:a14="http://schemas.microsoft.com/office/drawing/2010/main" w="9525">
                 <a:solidFill>
                   <a:srgbClr val="000000"/>
                 </a:solidFill>
@@ -1989,7 +1994,7 @@
           <a:ln/>
           <a:extLst>
             <a:ext uri="{91240B29-F687-4f45-9708-019B960494DF}">
-              <a14:hiddenLine xmlns:a14="http://schemas.microsoft.com/office/drawing/2010/main" xmlns="" w="9525">
+              <a14:hiddenLine xmlns="" xmlns:a14="http://schemas.microsoft.com/office/drawing/2010/main" w="9525">
                 <a:solidFill>
                   <a:srgbClr val="000000"/>
                 </a:solidFill>
@@ -2269,7 +2274,7 @@
           <a:ln/>
           <a:extLst>
             <a:ext uri="{91240B29-F687-4f45-9708-019B960494DF}">
-              <a14:hiddenLine xmlns:a14="http://schemas.microsoft.com/office/drawing/2010/main" xmlns="" w="9525">
+              <a14:hiddenLine xmlns="" xmlns:a14="http://schemas.microsoft.com/office/drawing/2010/main" w="9525">
                 <a:solidFill>
                   <a:srgbClr val="000000"/>
                 </a:solidFill>
@@ -2889,7 +2894,7 @@
           <a:ln/>
           <a:extLst>
             <a:ext uri="{91240B29-F687-4f45-9708-019B960494DF}">
-              <a14:hiddenLine xmlns:a14="http://schemas.microsoft.com/office/drawing/2010/main" xmlns="" w="9525">
+              <a14:hiddenLine xmlns="" xmlns:a14="http://schemas.microsoft.com/office/drawing/2010/main" w="9525">
                 <a:solidFill>
                   <a:srgbClr val="000000"/>
                 </a:solidFill>
@@ -3225,7 +3230,7 @@
           <a:ln/>
           <a:extLst>
             <a:ext uri="{91240B29-F687-4f45-9708-019B960494DF}">
-              <a14:hiddenLine xmlns:a14="http://schemas.microsoft.com/office/drawing/2010/main" xmlns="" w="9525">
+              <a14:hiddenLine xmlns="" xmlns:a14="http://schemas.microsoft.com/office/drawing/2010/main" w="9525">
                 <a:solidFill>
                   <a:srgbClr val="000000"/>
                 </a:solidFill>
@@ -3699,7 +3704,7 @@
           <a:ln/>
           <a:extLst>
             <a:ext uri="{91240B29-F687-4f45-9708-019B960494DF}">
-              <a14:hiddenLine xmlns:a14="http://schemas.microsoft.com/office/drawing/2010/main" xmlns="" w="9525">
+              <a14:hiddenLine xmlns="" xmlns:a14="http://schemas.microsoft.com/office/drawing/2010/main" w="9525">
                 <a:solidFill>
                   <a:srgbClr val="000000"/>
                 </a:solidFill>
@@ -4122,7 +4127,7 @@
           <a:ln/>
           <a:extLst>
             <a:ext uri="{91240B29-F687-4f45-9708-019B960494DF}">
-              <a14:hiddenLine xmlns:a14="http://schemas.microsoft.com/office/drawing/2010/main" xmlns="" w="9525">
+              <a14:hiddenLine xmlns="" xmlns:a14="http://schemas.microsoft.com/office/drawing/2010/main" w="9525">
                 <a:solidFill>
                   <a:srgbClr val="000000"/>
                 </a:solidFill>
@@ -5829,7 +5834,38 @@
           <a:bodyPr/>
           <a:lstStyle/>
           <a:p>
-            <a:endParaRPr lang="es-US"/>
+            <a:r>
+              <a:rPr lang="en-US" dirty="0"/>
+              <a:t>Observer</a:t>
+            </a:r>
+          </a:p>
+          <a:p>
+            <a:pPr lvl="1"/>
+            <a:r>
+              <a:rPr lang="en-US" dirty="0"/>
+              <a:t>The Server Host serves as the "Observable" and the players connected Observe it for updates.</a:t>
+            </a:r>
+          </a:p>
+          <a:p>
+            <a:r>
+              <a:rPr lang="en-US" dirty="0"/>
+              <a:t>Proxy</a:t>
+            </a:r>
+          </a:p>
+          <a:p>
+            <a:pPr lvl="1"/>
+            <a:r>
+              <a:rPr lang="en-US" dirty="0"/>
+              <a:t>The way Online Play works is through classes called "Server.java" and "Client.java". These are objects that allow control and manipulation of the </a:t>
+            </a:r>
+            <a:r>
+              <a:rPr lang="en-US" dirty="0" err="1"/>
+              <a:t>ServerSocket</a:t>
+            </a:r>
+            <a:r>
+              <a:rPr lang="en-US" dirty="0"/>
+              <a:t> and normal Sockets, which fits the definition of Proxy.</a:t>
+            </a:r>
           </a:p>
         </p:txBody>
       </p:sp>

</xml_diff>